<commit_message>
Added Template method pattern code
</commit_message>
<xml_diff>
--- a/Iterator/IteratorPattern.pptx
+++ b/Iterator/IteratorPattern.pptx
@@ -8884,14 +8884,14 @@
               <a:buNone/>
             </a:pPr>
             <a:r>
-              <a:rPr lang="en">
+              <a:rPr lang="en" dirty="0">
                 <a:solidFill>
                   <a:srgbClr val="85B042"/>
                 </a:solidFill>
               </a:rPr>
               <a:t>Next Session</a:t>
             </a:r>
-            <a:endParaRPr>
+            <a:endParaRPr dirty="0">
               <a:solidFill>
                 <a:srgbClr val="85B042"/>
               </a:solidFill>
@@ -8954,7 +8954,7 @@
         <p:spPr>
           <a:xfrm>
             <a:off x="5372900" y="2967700"/>
-            <a:ext cx="4262700" cy="497400"/>
+            <a:ext cx="4262700" cy="1947200"/>
           </a:xfrm>
           <a:prstGeom prst="rect">
             <a:avLst/>
@@ -8970,17 +8970,9 @@
           </a:bodyPr>
           <a:lstStyle/>
           <a:p>
-            <a:pPr marL="0" lvl="0" indent="0" algn="l" rtl="0">
-              <a:spcBef>
-                <a:spcPts val="0"/>
-              </a:spcBef>
-              <a:spcAft>
-                <a:spcPts val="0"/>
-              </a:spcAft>
-              <a:buNone/>
-            </a:pPr>
+            <a:pPr lvl="0"/>
             <a:r>
-              <a:rPr lang="en" sz="1000">
+              <a:rPr lang="en-GB" sz="1000" dirty="0">
                 <a:solidFill>
                   <a:schemeClr val="lt1"/>
                 </a:solidFill>
@@ -8989,9 +8981,21 @@
                 <a:cs typeface="Courier New"/>
                 <a:sym typeface="Courier New"/>
               </a:rPr>
-              <a:t>Spektrix.PatternsGroup.Members.ForEach(m =&gt;</a:t>
+              <a:t>abstract class </a:t>
             </a:r>
-            <a:endParaRPr sz="1000">
+            <a:r>
+              <a:rPr lang="en-GB" sz="1000" dirty="0" err="1">
+                <a:solidFill>
+                  <a:schemeClr val="lt1"/>
+                </a:solidFill>
+                <a:latin typeface="Courier New"/>
+                <a:ea typeface="Courier New"/>
+                <a:cs typeface="Courier New"/>
+                <a:sym typeface="Courier New"/>
+              </a:rPr>
+              <a:t>PatternsStudyGroup</a:t>
+            </a:r>
+            <a:endParaRPr lang="en-GB" sz="1000" dirty="0">
               <a:solidFill>
                 <a:schemeClr val="lt1"/>
               </a:solidFill>
@@ -9002,17 +9006,9 @@
             </a:endParaRPr>
           </a:p>
           <a:p>
-            <a:pPr marL="0" lvl="0" indent="457200" algn="l" rtl="0">
-              <a:spcBef>
-                <a:spcPts val="0"/>
-              </a:spcBef>
-              <a:spcAft>
-                <a:spcPts val="0"/>
-              </a:spcAft>
-              <a:buNone/>
-            </a:pPr>
+            <a:pPr lvl="0"/>
             <a:r>
-              <a:rPr lang="en" sz="1000">
+              <a:rPr lang="en-GB" sz="1000" dirty="0">
                 <a:solidFill>
                   <a:schemeClr val="lt1"/>
                 </a:solidFill>
@@ -9021,30 +9017,13 @@
                 <a:cs typeface="Courier New"/>
                 <a:sym typeface="Courier New"/>
               </a:rPr>
-              <a:t>m.Traverse(patterns)</a:t>
+              <a:t>{</a:t>
             </a:r>
-            <a:endParaRPr sz="1000">
-              <a:solidFill>
-                <a:schemeClr val="lt1"/>
-              </a:solidFill>
-              <a:latin typeface="Courier New"/>
-              <a:ea typeface="Courier New"/>
-              <a:cs typeface="Courier New"/>
-              <a:sym typeface="Courier New"/>
-            </a:endParaRPr>
           </a:p>
           <a:p>
-            <a:pPr marL="0" lvl="0" indent="0" algn="l" rtl="0">
-              <a:spcBef>
-                <a:spcPts val="0"/>
-              </a:spcBef>
-              <a:spcAft>
-                <a:spcPts val="0"/>
-              </a:spcAft>
-              <a:buNone/>
-            </a:pPr>
+            <a:pPr lvl="0"/>
             <a:r>
-              <a:rPr lang="en" sz="1000">
+              <a:rPr lang="en-GB" sz="1000" dirty="0">
                 <a:solidFill>
                   <a:schemeClr val="lt1"/>
                 </a:solidFill>
@@ -9053,9 +9032,240 @@
                 <a:cs typeface="Courier New"/>
                 <a:sym typeface="Courier New"/>
               </a:rPr>
-              <a:t>)</a:t>
+              <a:t>    protected void Run()</a:t>
             </a:r>
-            <a:endParaRPr sz="1000">
+          </a:p>
+          <a:p>
+            <a:pPr lvl="0"/>
+            <a:r>
+              <a:rPr lang="en-GB" sz="1000" dirty="0">
+                <a:solidFill>
+                  <a:schemeClr val="lt1"/>
+                </a:solidFill>
+                <a:latin typeface="Courier New"/>
+                <a:ea typeface="Courier New"/>
+                <a:cs typeface="Courier New"/>
+                <a:sym typeface="Courier New"/>
+              </a:rPr>
+              <a:t>    {</a:t>
+            </a:r>
+          </a:p>
+          <a:p>
+            <a:pPr lvl="0"/>
+            <a:r>
+              <a:rPr lang="en-GB" sz="1000" dirty="0">
+                <a:solidFill>
+                  <a:schemeClr val="lt1"/>
+                </a:solidFill>
+                <a:latin typeface="Courier New"/>
+                <a:ea typeface="Courier New"/>
+                <a:cs typeface="Courier New"/>
+                <a:sym typeface="Courier New"/>
+              </a:rPr>
+              <a:t>       Introduction();</a:t>
+            </a:r>
+          </a:p>
+          <a:p>
+            <a:pPr lvl="0"/>
+            <a:r>
+              <a:rPr lang="en-GB" sz="1000" dirty="0">
+                <a:solidFill>
+                  <a:schemeClr val="lt1"/>
+                </a:solidFill>
+                <a:latin typeface="Courier New"/>
+                <a:ea typeface="Courier New"/>
+                <a:cs typeface="Courier New"/>
+                <a:sym typeface="Courier New"/>
+              </a:rPr>
+              <a:t>       </a:t>
+            </a:r>
+            <a:r>
+              <a:rPr lang="en-GB" sz="1000" dirty="0" err="1">
+                <a:solidFill>
+                  <a:schemeClr val="lt1"/>
+                </a:solidFill>
+                <a:latin typeface="Courier New"/>
+                <a:ea typeface="Courier New"/>
+                <a:cs typeface="Courier New"/>
+                <a:sym typeface="Courier New"/>
+              </a:rPr>
+              <a:t>HandsOnCode</a:t>
+            </a:r>
+            <a:r>
+              <a:rPr lang="en-GB" sz="1000" dirty="0">
+                <a:solidFill>
+                  <a:schemeClr val="lt1"/>
+                </a:solidFill>
+                <a:latin typeface="Courier New"/>
+                <a:ea typeface="Courier New"/>
+                <a:cs typeface="Courier New"/>
+                <a:sym typeface="Courier New"/>
+              </a:rPr>
+              <a:t>();</a:t>
+            </a:r>
+          </a:p>
+          <a:p>
+            <a:pPr lvl="0"/>
+            <a:r>
+              <a:rPr lang="en-GB" sz="1000" dirty="0">
+                <a:solidFill>
+                  <a:schemeClr val="lt1"/>
+                </a:solidFill>
+                <a:latin typeface="Courier New"/>
+                <a:ea typeface="Courier New"/>
+                <a:cs typeface="Courier New"/>
+                <a:sym typeface="Courier New"/>
+              </a:rPr>
+              <a:t>       </a:t>
+            </a:r>
+            <a:r>
+              <a:rPr lang="en-GB" sz="1000" dirty="0" err="1">
+                <a:solidFill>
+                  <a:schemeClr val="lt1"/>
+                </a:solidFill>
+                <a:latin typeface="Courier New"/>
+                <a:ea typeface="Courier New"/>
+                <a:cs typeface="Courier New"/>
+                <a:sym typeface="Courier New"/>
+              </a:rPr>
+              <a:t>ReviewAndQuestions</a:t>
+            </a:r>
+            <a:r>
+              <a:rPr lang="en-GB" sz="1000" dirty="0">
+                <a:solidFill>
+                  <a:schemeClr val="lt1"/>
+                </a:solidFill>
+                <a:latin typeface="Courier New"/>
+                <a:ea typeface="Courier New"/>
+                <a:cs typeface="Courier New"/>
+                <a:sym typeface="Courier New"/>
+              </a:rPr>
+              <a:t>();</a:t>
+            </a:r>
+          </a:p>
+          <a:p>
+            <a:pPr lvl="0"/>
+            <a:r>
+              <a:rPr lang="en-GB" sz="1000" dirty="0">
+                <a:solidFill>
+                  <a:schemeClr val="lt1"/>
+                </a:solidFill>
+                <a:latin typeface="Courier New"/>
+                <a:ea typeface="Courier New"/>
+                <a:cs typeface="Courier New"/>
+                <a:sym typeface="Courier New"/>
+              </a:rPr>
+              <a:t>    }</a:t>
+            </a:r>
+          </a:p>
+          <a:p>
+            <a:pPr lvl="0"/>
+            <a:r>
+              <a:rPr lang="en-GB" sz="1000" dirty="0">
+                <a:solidFill>
+                  <a:schemeClr val="lt1"/>
+                </a:solidFill>
+                <a:latin typeface="Courier New"/>
+                <a:ea typeface="Courier New"/>
+                <a:cs typeface="Courier New"/>
+                <a:sym typeface="Courier New"/>
+              </a:rPr>
+              <a:t>    abstract void Introduction() {}</a:t>
+            </a:r>
+          </a:p>
+          <a:p>
+            <a:pPr lvl="0"/>
+            <a:r>
+              <a:rPr lang="en-GB" sz="1000" dirty="0">
+                <a:solidFill>
+                  <a:schemeClr val="lt1"/>
+                </a:solidFill>
+                <a:latin typeface="Courier New"/>
+                <a:ea typeface="Courier New"/>
+                <a:cs typeface="Courier New"/>
+                <a:sym typeface="Courier New"/>
+              </a:rPr>
+              <a:t>    abstract void </a:t>
+            </a:r>
+            <a:r>
+              <a:rPr lang="en-GB" sz="1000" dirty="0" err="1">
+                <a:solidFill>
+                  <a:schemeClr val="lt1"/>
+                </a:solidFill>
+                <a:latin typeface="Courier New"/>
+                <a:ea typeface="Courier New"/>
+                <a:cs typeface="Courier New"/>
+                <a:sym typeface="Courier New"/>
+              </a:rPr>
+              <a:t>HandsOnCode</a:t>
+            </a:r>
+            <a:r>
+              <a:rPr lang="en-GB" sz="1000" dirty="0">
+                <a:solidFill>
+                  <a:schemeClr val="lt1"/>
+                </a:solidFill>
+                <a:latin typeface="Courier New"/>
+                <a:ea typeface="Courier New"/>
+                <a:cs typeface="Courier New"/>
+                <a:sym typeface="Courier New"/>
+              </a:rPr>
+              <a:t>() {}</a:t>
+            </a:r>
+          </a:p>
+          <a:p>
+            <a:pPr lvl="0"/>
+            <a:r>
+              <a:rPr lang="en-GB" sz="1000" dirty="0">
+                <a:solidFill>
+                  <a:schemeClr val="lt1"/>
+                </a:solidFill>
+                <a:latin typeface="Courier New"/>
+                <a:ea typeface="Courier New"/>
+                <a:cs typeface="Courier New"/>
+                <a:sym typeface="Courier New"/>
+              </a:rPr>
+              <a:t>    abstract void </a:t>
+            </a:r>
+            <a:r>
+              <a:rPr lang="en-GB" sz="1000" dirty="0" err="1">
+                <a:solidFill>
+                  <a:schemeClr val="lt1"/>
+                </a:solidFill>
+                <a:latin typeface="Courier New"/>
+                <a:ea typeface="Courier New"/>
+                <a:cs typeface="Courier New"/>
+                <a:sym typeface="Courier New"/>
+              </a:rPr>
+              <a:t>ReviewAndQuestions</a:t>
+            </a:r>
+            <a:r>
+              <a:rPr lang="en-GB" sz="1000" dirty="0">
+                <a:solidFill>
+                  <a:schemeClr val="lt1"/>
+                </a:solidFill>
+                <a:latin typeface="Courier New"/>
+                <a:ea typeface="Courier New"/>
+                <a:cs typeface="Courier New"/>
+                <a:sym typeface="Courier New"/>
+              </a:rPr>
+              <a:t>() {}</a:t>
+            </a:r>
+          </a:p>
+          <a:p>
+            <a:pPr lvl="0"/>
+            <a:r>
+              <a:rPr lang="en-GB" sz="1000" dirty="0">
+                <a:solidFill>
+                  <a:schemeClr val="lt1"/>
+                </a:solidFill>
+                <a:latin typeface="Courier New"/>
+                <a:ea typeface="Courier New"/>
+                <a:cs typeface="Courier New"/>
+                <a:sym typeface="Courier New"/>
+              </a:rPr>
+              <a:t>}</a:t>
+            </a:r>
+            <a:endParaRPr sz="1000" dirty="0">
               <a:solidFill>
                 <a:schemeClr val="lt1"/>
               </a:solidFill>

</xml_diff>

<commit_message>
Extra slide on why to use iterator pattern
</commit_message>
<xml_diff>
--- a/Iterator/IteratorPattern.pptx
+++ b/Iterator/IteratorPattern.pptx
@@ -5,7 +5,7 @@
     <p:sldMasterId id="2147483659" r:id="rId1"/>
   </p:sldMasterIdLst>
   <p:notesMasterIdLst>
-    <p:notesMasterId r:id="rId8"/>
+    <p:notesMasterId r:id="rId9"/>
   </p:notesMasterIdLst>
   <p:sldIdLst>
     <p:sldId id="256" r:id="rId2"/>
@@ -13,43 +13,44 @@
     <p:sldId id="258" r:id="rId4"/>
     <p:sldId id="261" r:id="rId5"/>
     <p:sldId id="259" r:id="rId6"/>
-    <p:sldId id="260" r:id="rId7"/>
+    <p:sldId id="262" r:id="rId7"/>
+    <p:sldId id="260" r:id="rId8"/>
   </p:sldIdLst>
   <p:sldSz cx="9144000" cy="5143500" type="screen16x9"/>
   <p:notesSz cx="6858000" cy="9144000"/>
   <p:embeddedFontLst>
     <p:embeddedFont>
       <p:font typeface="Calibri" panose="020F0502020204030204" pitchFamily="34" charset="0"/>
-      <p:regular r:id="rId9"/>
-      <p:bold r:id="rId10"/>
-      <p:italic r:id="rId11"/>
-      <p:boldItalic r:id="rId12"/>
+      <p:regular r:id="rId10"/>
+      <p:bold r:id="rId11"/>
+      <p:italic r:id="rId12"/>
+      <p:boldItalic r:id="rId13"/>
     </p:embeddedFont>
     <p:embeddedFont>
       <p:font typeface="Lato" panose="020F0502020204030203" pitchFamily="34" charset="0"/>
-      <p:regular r:id="rId13"/>
-      <p:bold r:id="rId14"/>
-      <p:italic r:id="rId15"/>
-      <p:boldItalic r:id="rId16"/>
+      <p:regular r:id="rId14"/>
+      <p:bold r:id="rId15"/>
+      <p:italic r:id="rId16"/>
+      <p:boldItalic r:id="rId17"/>
     </p:embeddedFont>
     <p:embeddedFont>
       <p:font typeface="Raleway" panose="020B0604020202020204" charset="0"/>
-      <p:regular r:id="rId17"/>
-      <p:bold r:id="rId18"/>
-      <p:italic r:id="rId19"/>
-      <p:boldItalic r:id="rId20"/>
+      <p:regular r:id="rId18"/>
+      <p:bold r:id="rId19"/>
+      <p:italic r:id="rId20"/>
+      <p:boldItalic r:id="rId21"/>
     </p:embeddedFont>
     <p:embeddedFont>
       <p:font typeface="Raleway ExtraBold" panose="020B0604020202020204" charset="0"/>
-      <p:bold r:id="rId21"/>
-      <p:boldItalic r:id="rId22"/>
+      <p:bold r:id="rId22"/>
+      <p:boldItalic r:id="rId23"/>
     </p:embeddedFont>
     <p:embeddedFont>
-      <p:font typeface="Roboto" panose="020B0604020202020204" charset="0"/>
-      <p:regular r:id="rId23"/>
-      <p:bold r:id="rId24"/>
-      <p:italic r:id="rId25"/>
-      <p:boldItalic r:id="rId26"/>
+      <p:font typeface="Roboto" panose="02000000000000000000" pitchFamily="2" charset="0"/>
+      <p:regular r:id="rId24"/>
+      <p:bold r:id="rId25"/>
+      <p:italic r:id="rId26"/>
+      <p:boldItalic r:id="rId27"/>
     </p:embeddedFont>
   </p:embeddedFontLst>
   <p:defaultTextStyle>
@@ -8781,6 +8782,139 @@
   <p:cSld>
     <p:spTree>
       <p:nvGrpSpPr>
+        <p:cNvPr id="1" name=""/>
+        <p:cNvGrpSpPr/>
+        <p:nvPr/>
+      </p:nvGrpSpPr>
+      <p:grpSpPr>
+        <a:xfrm>
+          <a:off x="0" y="0"/>
+          <a:ext cx="0" cy="0"/>
+          <a:chOff x="0" y="0"/>
+          <a:chExt cx="0" cy="0"/>
+        </a:xfrm>
+      </p:grpSpPr>
+      <p:sp>
+        <p:nvSpPr>
+          <p:cNvPr id="2" name="Title 1">
+            <a:extLst>
+              <a:ext uri="{FF2B5EF4-FFF2-40B4-BE49-F238E27FC236}">
+                <a16:creationId xmlns:a16="http://schemas.microsoft.com/office/drawing/2014/main" id="{DBD48611-3FE5-4415-82F8-DDE7DFDB5BD3}"/>
+              </a:ext>
+            </a:extLst>
+          </p:cNvPr>
+          <p:cNvSpPr>
+            <a:spLocks noGrp="1"/>
+          </p:cNvSpPr>
+          <p:nvPr>
+            <p:ph type="title"/>
+          </p:nvPr>
+        </p:nvSpPr>
+        <p:spPr/>
+        <p:txBody>
+          <a:bodyPr/>
+          <a:lstStyle/>
+          <a:p>
+            <a:r>
+              <a:rPr lang="en-GB" dirty="0"/>
+              <a:t>What if we didn’t use it?</a:t>
+            </a:r>
+          </a:p>
+        </p:txBody>
+      </p:sp>
+      <p:sp>
+        <p:nvSpPr>
+          <p:cNvPr id="3" name="Text Placeholder 2">
+            <a:extLst>
+              <a:ext uri="{FF2B5EF4-FFF2-40B4-BE49-F238E27FC236}">
+                <a16:creationId xmlns:a16="http://schemas.microsoft.com/office/drawing/2014/main" id="{BBFEE13A-9D45-43C3-B355-E10831396D22}"/>
+              </a:ext>
+            </a:extLst>
+          </p:cNvPr>
+          <p:cNvSpPr>
+            <a:spLocks noGrp="1"/>
+          </p:cNvSpPr>
+          <p:nvPr>
+            <p:ph type="body" idx="1"/>
+          </p:nvPr>
+        </p:nvSpPr>
+        <p:spPr/>
+        <p:txBody>
+          <a:bodyPr/>
+          <a:lstStyle/>
+          <a:p>
+            <a:r>
+              <a:rPr lang="en-GB" dirty="0"/>
+              <a:t>Standard “for” loop manually iterating over aggregate</a:t>
+            </a:r>
+          </a:p>
+          <a:p>
+            <a:pPr lvl="1"/>
+            <a:r>
+              <a:rPr lang="en-GB" dirty="0"/>
+              <a:t>What if aggregation doesn’t have accessible length?</a:t>
+            </a:r>
+          </a:p>
+          <a:p>
+            <a:pPr lvl="1"/>
+            <a:r>
+              <a:rPr lang="en-GB" dirty="0"/>
+              <a:t>Not always one dimensional </a:t>
+            </a:r>
+            <a:r>
+              <a:rPr lang="en-GB" dirty="0" err="1"/>
+              <a:t>eg</a:t>
+            </a:r>
+            <a:r>
+              <a:rPr lang="en-GB" dirty="0"/>
+              <a:t> trees</a:t>
+            </a:r>
+          </a:p>
+          <a:p>
+            <a:pPr lvl="1"/>
+            <a:endParaRPr lang="en-GB" dirty="0"/>
+          </a:p>
+          <a:p>
+            <a:r>
+              <a:rPr lang="en-GB" dirty="0"/>
+              <a:t>Integrate iteration into collection (</a:t>
+            </a:r>
+            <a:r>
+              <a:rPr lang="en-GB" dirty="0" err="1"/>
+              <a:t>ie</a:t>
+            </a:r>
+            <a:r>
+              <a:rPr lang="en-GB" dirty="0"/>
+              <a:t> current and next in aggregation object)</a:t>
+            </a:r>
+          </a:p>
+          <a:p>
+            <a:pPr lvl="1"/>
+            <a:r>
+              <a:rPr lang="en-GB" dirty="0"/>
+              <a:t>Not the responsibility of that object</a:t>
+            </a:r>
+          </a:p>
+        </p:txBody>
+      </p:sp>
+    </p:spTree>
+    <p:extLst>
+      <p:ext uri="{BB962C8B-B14F-4D97-AF65-F5344CB8AC3E}">
+        <p14:creationId xmlns:p14="http://schemas.microsoft.com/office/powerpoint/2010/main" val="590851584"/>
+      </p:ext>
+    </p:extLst>
+  </p:cSld>
+  <p:clrMapOvr>
+    <a:masterClrMapping/>
+  </p:clrMapOvr>
+</p:sld>
+</file>
+
+<file path=ppt/slides/slide7.xml><?xml version="1.0" encoding="utf-8"?>
+<p:sld xmlns:a="http://schemas.openxmlformats.org/drawingml/2006/main" xmlns:r="http://schemas.openxmlformats.org/officeDocument/2006/relationships" xmlns:p="http://schemas.openxmlformats.org/presentationml/2006/main">
+  <p:cSld>
+    <p:spTree>
+      <p:nvGrpSpPr>
         <p:cNvPr id="1" name="Shape 104"/>
         <p:cNvGrpSpPr/>
         <p:nvPr/>

</xml_diff>